<commit_message>
Added PDF of hackathon outline
</commit_message>
<xml_diff>
--- a/resources/workshop-presentations/aqmen_data-wrangling-hackathon_201903.pptx
+++ b/resources/workshop-presentations/aqmen_data-wrangling-hackathon_201903.pptx
@@ -108,6 +108,11 @@
       </a:defRPr>
     </a:lvl9pPr>
   </p:defaultTextStyle>
+  <p:extLst>
+    <p:ext uri="{EFAFB233-063F-42B5-8137-9DF3F51BA10A}">
+      <p15:sldGuideLst xmlns:p15="http://schemas.microsoft.com/office/powerpoint/2012/main"/>
+    </p:ext>
+  </p:extLst>
 </p:presentation>
 </file>
 
@@ -3958,13 +3963,7 @@
               <a:rPr lang="en-GB" altLang="en-US" sz="2200" dirty="0">
                 <a:latin typeface="Arial" charset="0"/>
               </a:rPr>
-              <a:t>of </a:t>
-            </a:r>
-            <a:r>
-              <a:rPr lang="en-GB" altLang="en-US" sz="2200" dirty="0">
-                <a:latin typeface="Arial" charset="0"/>
-              </a:rPr>
-              <a:t>Edinburgh</a:t>
+              <a:t>of Edinburgh</a:t>
             </a:r>
           </a:p>
           <a:p>
@@ -4044,13 +4043,7 @@
               <a:rPr lang="en-GB" altLang="en-US" sz="1400" dirty="0">
                 <a:latin typeface="Arial" charset="0"/>
               </a:rPr>
-              <a:t> </a:t>
-            </a:r>
-            <a:r>
-              <a:rPr lang="en-GB" altLang="en-US" sz="1400" dirty="0">
-                <a:latin typeface="Arial" charset="0"/>
-              </a:rPr>
-              <a:t>Diarmuid </a:t>
+              <a:t> Diarmuid </a:t>
             </a:r>
             <a:r>
               <a:rPr lang="en-GB" altLang="en-US" sz="1400" dirty="0" smtClean="0">
@@ -4656,15 +4649,7 @@
           <a:p>
             <a:r>
               <a:rPr lang="en-GB" dirty="0" smtClean="0"/>
-              <a:t>Read the brief </a:t>
-            </a:r>
-            <a:r>
-              <a:rPr lang="en-GB" dirty="0" smtClean="0"/>
-              <a:t>in the ‘hackathon’ folder </a:t>
-            </a:r>
-            <a:r>
-              <a:rPr lang="en-GB" dirty="0" smtClean="0"/>
-              <a:t>on the workshop </a:t>
+              <a:t>Read the brief in the ‘hackathon’ folder on the workshop </a:t>
             </a:r>
             <a:r>
               <a:rPr lang="en-GB" dirty="0" err="1" smtClean="0"/>
@@ -4684,7 +4669,15 @@
           <a:p>
             <a:r>
               <a:rPr lang="en-GB" dirty="0" smtClean="0"/>
-              <a:t>If stuck ask the tutors for assistance. However, this is not an assignment and there isn’t a solution, so use that freedom to make mistakes and to try out different data wrangling approaches.</a:t>
+              <a:t>If stuck ask the tutors for assistance. However, this is not an assignment and there isn’t </a:t>
+            </a:r>
+            <a:r>
+              <a:rPr lang="en-GB" smtClean="0"/>
+              <a:t>an official solution</a:t>
+            </a:r>
+            <a:r>
+              <a:rPr lang="en-GB" dirty="0" smtClean="0"/>
+              <a:t>, so use that freedom to make mistakes and to try out different data wrangling approaches.</a:t>
             </a:r>
           </a:p>
           <a:p>

</xml_diff>